<commit_message>
Updated study of effective java
</commit_message>
<xml_diff>
--- a/Study of Effective Java™.pptx
+++ b/Study of Effective Java™.pptx
@@ -17209,7 +17209,6 @@
               <a:rPr lang="en-US" dirty="0"/>
               <a:t>used to export constants.</a:t>
             </a:r>
-            <a:endParaRPr lang="en-US" dirty="0"/>
           </a:p>
         </p:txBody>
       </p:sp>
@@ -17320,7 +17319,6 @@
               <a:rPr lang="en-US" dirty="0"/>
               <a:t>field, consider refactoring it into a hierarchy.</a:t>
             </a:r>
-            <a:endParaRPr lang="en-US" dirty="0"/>
           </a:p>
         </p:txBody>
       </p:sp>
@@ -17454,7 +17452,6 @@
               <a:rPr lang="en-US" dirty="0"/>
               <a:t>static final field whose type is the strategy interface.</a:t>
             </a:r>
-            <a:endParaRPr lang="en-US" dirty="0"/>
           </a:p>
         </p:txBody>
       </p:sp>
@@ -18730,7 +18727,6 @@
               <a:rPr lang="en-US" dirty="0"/>
               <a:t>your best to eliminate these warnings</a:t>
             </a:r>
-            <a:endParaRPr lang="en-US" dirty="0"/>
           </a:p>
         </p:txBody>
       </p:sp>
@@ -18783,7 +18779,6 @@
               <a:rPr lang="en-US" dirty="0"/>
               <a:t>Item 25: Prefer lists to arrays</a:t>
             </a:r>
-            <a:endParaRPr lang="en-US" dirty="0"/>
           </a:p>
         </p:txBody>
       </p:sp>
@@ -18802,6 +18797,104 @@
           <a:bodyPr/>
           <a:lstStyle/>
           <a:p>
+            <a:pPr marL="177800" indent="0">
+              <a:buNone/>
+            </a:pPr>
+            <a:r>
+              <a:rPr lang="en-US" dirty="0"/>
+              <a:t>A</a:t>
+            </a:r>
+            <a:r>
+              <a:rPr lang="en-US" dirty="0" smtClean="0"/>
+              <a:t>rrays </a:t>
+            </a:r>
+            <a:r>
+              <a:rPr lang="en-US" dirty="0"/>
+              <a:t>and generics have very different type rules. </a:t>
+            </a:r>
+            <a:endParaRPr lang="en-US" dirty="0" smtClean="0"/>
+          </a:p>
+          <a:p>
+            <a:pPr marL="177800" indent="0">
+              <a:buNone/>
+            </a:pPr>
+            <a:r>
+              <a:rPr lang="en-US" dirty="0"/>
+              <a:t>	</a:t>
+            </a:r>
+            <a:r>
+              <a:rPr lang="en-US" dirty="0" smtClean="0"/>
+              <a:t>Arrays are covariant </a:t>
+            </a:r>
+            <a:r>
+              <a:rPr lang="en-US" dirty="0"/>
+              <a:t>and reified; generics are invariant and erased. </a:t>
+            </a:r>
+            <a:endParaRPr lang="en-US" dirty="0" smtClean="0"/>
+          </a:p>
+          <a:p>
+            <a:pPr marL="177800" indent="0">
+              <a:buNone/>
+            </a:pPr>
+            <a:r>
+              <a:rPr lang="en-US" dirty="0" smtClean="0"/>
+              <a:t>As </a:t>
+            </a:r>
+            <a:r>
+              <a:rPr lang="en-US" dirty="0"/>
+              <a:t>a consequence, </a:t>
+            </a:r>
+            <a:r>
+              <a:rPr lang="en-US" dirty="0" smtClean="0"/>
+              <a:t>arrays provide </a:t>
+            </a:r>
+            <a:r>
+              <a:rPr lang="en-US" dirty="0"/>
+              <a:t>runtime type safety but not compile-time type safety and vice versa </a:t>
+            </a:r>
+            <a:r>
+              <a:rPr lang="en-US" dirty="0" smtClean="0"/>
+              <a:t>for generics</a:t>
+            </a:r>
+            <a:r>
+              <a:rPr lang="en-US" dirty="0"/>
+              <a:t>. </a:t>
+            </a:r>
+            <a:endParaRPr lang="en-US" dirty="0" smtClean="0"/>
+          </a:p>
+          <a:p>
+            <a:pPr marL="177800" indent="0">
+              <a:buNone/>
+            </a:pPr>
+            <a:r>
+              <a:rPr lang="en-US" dirty="0" smtClean="0"/>
+              <a:t>Generally </a:t>
+            </a:r>
+            <a:r>
+              <a:rPr lang="en-US" dirty="0"/>
+              <a:t>speaking, arrays and generics don’t mix well. If you find</a:t>
+            </a:r>
+          </a:p>
+          <a:p>
+            <a:pPr marL="177800" indent="0">
+              <a:buNone/>
+            </a:pPr>
+            <a:r>
+              <a:rPr lang="en-US" dirty="0" smtClean="0"/>
+              <a:t> yourself </a:t>
+            </a:r>
+            <a:r>
+              <a:rPr lang="en-US" dirty="0"/>
+              <a:t>mixing them and getting compile-time errors or warnings, your </a:t>
+            </a:r>
+            <a:r>
+              <a:rPr lang="en-US" dirty="0" smtClean="0"/>
+              <a:t>first impulse </a:t>
+            </a:r>
+            <a:r>
+              <a:rPr lang="en-US" dirty="0"/>
+              <a:t>should be to replace the arrays with lists</a:t>
+            </a:r>
             <a:endParaRPr lang="en-US" dirty="0"/>
           </a:p>
         </p:txBody>
@@ -18878,7 +18971,78 @@
           <a:bodyPr/>
           <a:lstStyle/>
           <a:p>
-            <a:endParaRPr lang="en-US"/>
+            <a:pPr marL="177800" indent="0">
+              <a:buNone/>
+            </a:pPr>
+            <a:r>
+              <a:rPr lang="en-US" dirty="0"/>
+              <a:t>G</a:t>
+            </a:r>
+            <a:r>
+              <a:rPr lang="en-US" dirty="0" smtClean="0"/>
+              <a:t>eneric </a:t>
+            </a:r>
+            <a:r>
+              <a:rPr lang="en-US" dirty="0"/>
+              <a:t>types are safer and easier to use than types that </a:t>
+            </a:r>
+            <a:r>
+              <a:rPr lang="en-US" dirty="0" smtClean="0"/>
+              <a:t>require casts </a:t>
+            </a:r>
+            <a:r>
+              <a:rPr lang="en-US" dirty="0"/>
+              <a:t>in client code. When you design new types, make sure that they can be </a:t>
+            </a:r>
+            <a:r>
+              <a:rPr lang="en-US" dirty="0" smtClean="0"/>
+              <a:t>used without </a:t>
+            </a:r>
+            <a:r>
+              <a:rPr lang="en-US" dirty="0"/>
+              <a:t>such casts. </a:t>
+            </a:r>
+            <a:endParaRPr lang="en-US" dirty="0" smtClean="0"/>
+          </a:p>
+          <a:p>
+            <a:pPr marL="177800" indent="0">
+              <a:buNone/>
+            </a:pPr>
+            <a:r>
+              <a:rPr lang="en-US" dirty="0" smtClean="0"/>
+              <a:t>This </a:t>
+            </a:r>
+            <a:r>
+              <a:rPr lang="en-US" dirty="0"/>
+              <a:t>will often mean making the types generic. </a:t>
+            </a:r>
+            <a:endParaRPr lang="en-US" dirty="0" smtClean="0"/>
+          </a:p>
+          <a:p>
+            <a:pPr marL="177800" indent="0">
+              <a:buNone/>
+            </a:pPr>
+            <a:r>
+              <a:rPr lang="en-US" dirty="0" smtClean="0"/>
+              <a:t>Generify your existing </a:t>
+            </a:r>
+            <a:r>
+              <a:rPr lang="en-US" dirty="0"/>
+              <a:t>types as time permits. This will make life easier for new users of </a:t>
+            </a:r>
+            <a:r>
+              <a:rPr lang="en-US" dirty="0" smtClean="0"/>
+              <a:t>these types </a:t>
+            </a:r>
+            <a:r>
+              <a:rPr lang="en-US" dirty="0"/>
+              <a:t>without breaking existing </a:t>
+            </a:r>
+            <a:r>
+              <a:rPr lang="en-US" dirty="0" smtClean="0"/>
+              <a:t>clients (Item 23)</a:t>
+            </a:r>
+            <a:endParaRPr lang="en-US" dirty="0"/>
           </a:p>
         </p:txBody>
       </p:sp>
@@ -18931,7 +19095,6 @@
               <a:rPr lang="en-US" dirty="0"/>
               <a:t>Item 27: Favor generic methods</a:t>
             </a:r>
-            <a:endParaRPr lang="en-US" dirty="0"/>
           </a:p>
         </p:txBody>
       </p:sp>
@@ -18950,7 +19113,63 @@
           <a:bodyPr/>
           <a:lstStyle/>
           <a:p>
-            <a:endParaRPr lang="en-US"/>
+            <a:pPr marL="177800" indent="0">
+              <a:buNone/>
+            </a:pPr>
+            <a:r>
+              <a:rPr lang="en-US" dirty="0"/>
+              <a:t>G</a:t>
+            </a:r>
+            <a:r>
+              <a:rPr lang="en-US" dirty="0" smtClean="0"/>
+              <a:t>eneric </a:t>
+            </a:r>
+            <a:r>
+              <a:rPr lang="en-US" dirty="0"/>
+              <a:t>methods, like generic types, are safer and easier to </a:t>
+            </a:r>
+            <a:r>
+              <a:rPr lang="en-US" dirty="0" smtClean="0"/>
+              <a:t>use than </a:t>
+            </a:r>
+            <a:r>
+              <a:rPr lang="en-US" dirty="0"/>
+              <a:t>methods that require their clients to cast input parameters and return values.</a:t>
+            </a:r>
+          </a:p>
+          <a:p>
+            <a:pPr marL="177800" indent="0">
+              <a:buNone/>
+            </a:pPr>
+            <a:r>
+              <a:rPr lang="en-US" dirty="0"/>
+              <a:t>Like types, you should make sure that your new methods can be used </a:t>
+            </a:r>
+            <a:r>
+              <a:rPr lang="en-US" dirty="0" smtClean="0"/>
+              <a:t>without casts</a:t>
+            </a:r>
+            <a:r>
+              <a:rPr lang="en-US" dirty="0"/>
+              <a:t>, which will often mean making them generic. And like types, you </a:t>
+            </a:r>
+            <a:r>
+              <a:rPr lang="en-US" dirty="0" smtClean="0"/>
+              <a:t>should generify </a:t>
+            </a:r>
+            <a:r>
+              <a:rPr lang="en-US" dirty="0"/>
+              <a:t>your existing methods to make life easier for new users without </a:t>
+            </a:r>
+            <a:r>
+              <a:rPr lang="en-US" dirty="0" smtClean="0"/>
+              <a:t>breaking existing </a:t>
+            </a:r>
+            <a:r>
+              <a:rPr lang="en-US" dirty="0"/>
+              <a:t>clients (Item 23).</a:t>
+            </a:r>
+            <a:endParaRPr lang="en-US" dirty="0"/>
           </a:p>
         </p:txBody>
       </p:sp>
@@ -19087,7 +19306,6 @@
               <a:rPr lang="en-US" dirty="0"/>
               <a:t> heterogeneous containers</a:t>
             </a:r>
-            <a:endParaRPr lang="en-US" dirty="0"/>
           </a:p>
         </p:txBody>
       </p:sp>
@@ -19682,7 +19900,6 @@
               <a:rPr lang="en-US" dirty="0"/>
               <a:t>Item 31: Use instance fields instead of ordinals</a:t>
             </a:r>
-            <a:endParaRPr lang="en-US" dirty="0"/>
           </a:p>
         </p:txBody>
       </p:sp>
@@ -19762,7 +19979,6 @@
               <a:rPr lang="en-US" dirty="0"/>
               <a:t> instead of bit fields</a:t>
             </a:r>
-            <a:endParaRPr lang="en-US" dirty="0"/>
           </a:p>
         </p:txBody>
       </p:sp>
@@ -19926,7 +20142,6 @@
               <a:rPr lang="en-US" dirty="0"/>
               <a:t> with interfaces</a:t>
             </a:r>
-            <a:endParaRPr lang="en-US" dirty="0"/>
           </a:p>
         </p:txBody>
       </p:sp>
@@ -19998,7 +20213,6 @@
               <a:rPr lang="en-US" dirty="0"/>
               <a:t>Item 35: Prefer annotations to naming patterns</a:t>
             </a:r>
-            <a:endParaRPr lang="en-US" dirty="0"/>
           </a:p>
         </p:txBody>
       </p:sp>
@@ -20146,7 +20360,6 @@
               <a:rPr lang="en-US" dirty="0"/>
               <a:t>Item 37: Use marker interfaces to define types</a:t>
             </a:r>
-            <a:endParaRPr lang="en-US" dirty="0"/>
           </a:p>
         </p:txBody>
       </p:sp>

</xml_diff>